<commit_message>
Revised graph legends and ticks, added new exhibit to presentation
</commit_message>
<xml_diff>
--- a/misc/Box Office Analysis.pptx
+++ b/misc/Box Office Analysis.pptx
@@ -9,13 +9,14 @@
     <p:sldId id="267" r:id="rId3"/>
     <p:sldId id="258" r:id="rId4"/>
     <p:sldId id="259" r:id="rId5"/>
-    <p:sldId id="262" r:id="rId6"/>
-    <p:sldId id="260" r:id="rId7"/>
-    <p:sldId id="263" r:id="rId8"/>
-    <p:sldId id="261" r:id="rId9"/>
-    <p:sldId id="264" r:id="rId10"/>
-    <p:sldId id="265" r:id="rId11"/>
-    <p:sldId id="266" r:id="rId12"/>
+    <p:sldId id="268" r:id="rId6"/>
+    <p:sldId id="262" r:id="rId7"/>
+    <p:sldId id="260" r:id="rId8"/>
+    <p:sldId id="263" r:id="rId9"/>
+    <p:sldId id="261" r:id="rId10"/>
+    <p:sldId id="264" r:id="rId11"/>
+    <p:sldId id="265" r:id="rId12"/>
+    <p:sldId id="266" r:id="rId13"/>
   </p:sldIdLst>
   <p:sldSz cx="12192000" cy="6858000"/>
   <p:notesSz cx="6858000" cy="9144000"/>
@@ -12293,7 +12294,7 @@
           <a:p>
             <a:fld id="{4C5ACBC2-97C7-4143-A53E-872FCD4D9C96}" type="datetimeFigureOut">
               <a:rPr lang="en-US" smtClean="0"/>
-              <a:t>3/24/2021</a:t>
+              <a:t>3/25/2021</a:t>
             </a:fld>
             <a:endParaRPr lang="en-US"/>
           </a:p>
@@ -12500,7 +12501,7 @@
           <a:p>
             <a:fld id="{4C5ACBC2-97C7-4143-A53E-872FCD4D9C96}" type="datetimeFigureOut">
               <a:rPr lang="en-US" smtClean="0"/>
-              <a:t>3/24/2021</a:t>
+              <a:t>3/25/2021</a:t>
             </a:fld>
             <a:endParaRPr lang="en-US"/>
           </a:p>
@@ -12680,7 +12681,7 @@
           <a:p>
             <a:fld id="{4C5ACBC2-97C7-4143-A53E-872FCD4D9C96}" type="datetimeFigureOut">
               <a:rPr lang="en-US" smtClean="0"/>
-              <a:t>3/24/2021</a:t>
+              <a:t>3/25/2021</a:t>
             </a:fld>
             <a:endParaRPr lang="en-US"/>
           </a:p>
@@ -12885,7 +12886,7 @@
           <a:p>
             <a:fld id="{4C5ACBC2-97C7-4143-A53E-872FCD4D9C96}" type="datetimeFigureOut">
               <a:rPr lang="en-US" smtClean="0"/>
-              <a:t>3/24/2021</a:t>
+              <a:t>3/25/2021</a:t>
             </a:fld>
             <a:endParaRPr lang="en-US"/>
           </a:p>
@@ -21783,7 +21784,7 @@
           <a:p>
             <a:fld id="{4C5ACBC2-97C7-4143-A53E-872FCD4D9C96}" type="datetimeFigureOut">
               <a:rPr lang="en-US" smtClean="0"/>
-              <a:t>3/24/2021</a:t>
+              <a:t>3/25/2021</a:t>
             </a:fld>
             <a:endParaRPr lang="en-US"/>
           </a:p>
@@ -22057,7 +22058,7 @@
           <a:p>
             <a:fld id="{4C5ACBC2-97C7-4143-A53E-872FCD4D9C96}" type="datetimeFigureOut">
               <a:rPr lang="en-US" smtClean="0"/>
-              <a:t>3/24/2021</a:t>
+              <a:t>3/25/2021</a:t>
             </a:fld>
             <a:endParaRPr lang="en-US"/>
           </a:p>
@@ -22455,7 +22456,7 @@
           <a:p>
             <a:fld id="{4C5ACBC2-97C7-4143-A53E-872FCD4D9C96}" type="datetimeFigureOut">
               <a:rPr lang="en-US" smtClean="0"/>
-              <a:t>3/24/2021</a:t>
+              <a:t>3/25/2021</a:t>
             </a:fld>
             <a:endParaRPr lang="en-US"/>
           </a:p>
@@ -22573,7 +22574,7 @@
           <a:p>
             <a:fld id="{4C5ACBC2-97C7-4143-A53E-872FCD4D9C96}" type="datetimeFigureOut">
               <a:rPr lang="en-US" smtClean="0"/>
-              <a:t>3/24/2021</a:t>
+              <a:t>3/25/2021</a:t>
             </a:fld>
             <a:endParaRPr lang="en-US"/>
           </a:p>
@@ -22668,7 +22669,7 @@
           <a:p>
             <a:fld id="{4C5ACBC2-97C7-4143-A53E-872FCD4D9C96}" type="datetimeFigureOut">
               <a:rPr lang="en-US" smtClean="0"/>
-              <a:t>3/24/2021</a:t>
+              <a:t>3/25/2021</a:t>
             </a:fld>
             <a:endParaRPr lang="en-US"/>
           </a:p>
@@ -22958,7 +22959,7 @@
           <a:p>
             <a:fld id="{4C5ACBC2-97C7-4143-A53E-872FCD4D9C96}" type="datetimeFigureOut">
               <a:rPr lang="en-US" smtClean="0"/>
-              <a:t>3/24/2021</a:t>
+              <a:t>3/25/2021</a:t>
             </a:fld>
             <a:endParaRPr lang="en-US"/>
           </a:p>
@@ -23238,7 +23239,7 @@
           <a:p>
             <a:fld id="{4C5ACBC2-97C7-4143-A53E-872FCD4D9C96}" type="datetimeFigureOut">
               <a:rPr lang="en-US" smtClean="0"/>
-              <a:t>3/24/2021</a:t>
+              <a:t>3/25/2021</a:t>
             </a:fld>
             <a:endParaRPr lang="en-US"/>
           </a:p>
@@ -23488,7 +23489,7 @@
           <a:p>
             <a:fld id="{4C5ACBC2-97C7-4143-A53E-872FCD4D9C96}" type="datetimeFigureOut">
               <a:rPr lang="en-US" smtClean="0"/>
-              <a:t>3/24/2021</a:t>
+              <a:t>3/25/2021</a:t>
             </a:fld>
             <a:endParaRPr lang="en-US"/>
           </a:p>
@@ -24532,6 +24533,96 @@
 <file path=ppt/slides/slide10.xml><?xml version="1.0" encoding="utf-8"?>
 <p:sld xmlns:a="http://schemas.openxmlformats.org/drawingml/2006/main" xmlns:r="http://schemas.openxmlformats.org/officeDocument/2006/relationships" xmlns:p="http://schemas.openxmlformats.org/presentationml/2006/main">
   <p:cSld>
+    <p:spTree>
+      <p:nvGrpSpPr>
+        <p:cNvPr id="1" name=""/>
+        <p:cNvGrpSpPr/>
+        <p:nvPr/>
+      </p:nvGrpSpPr>
+      <p:grpSpPr>
+        <a:xfrm>
+          <a:off x="0" y="0"/>
+          <a:ext cx="0" cy="0"/>
+          <a:chOff x="0" y="0"/>
+          <a:chExt cx="0" cy="0"/>
+        </a:xfrm>
+      </p:grpSpPr>
+      <p:sp>
+        <p:nvSpPr>
+          <p:cNvPr id="2" name="Title 1">
+            <a:extLst>
+              <a:ext uri="{FF2B5EF4-FFF2-40B4-BE49-F238E27FC236}">
+                <a16:creationId xmlns:a16="http://schemas.microsoft.com/office/drawing/2014/main" id="{BC8205F9-AD5E-454F-8FBA-339D16DBF12D}"/>
+              </a:ext>
+            </a:extLst>
+          </p:cNvPr>
+          <p:cNvSpPr>
+            <a:spLocks noGrp="1"/>
+          </p:cNvSpPr>
+          <p:nvPr>
+            <p:ph type="title"/>
+          </p:nvPr>
+        </p:nvSpPr>
+        <p:spPr/>
+        <p:txBody>
+          <a:bodyPr/>
+          <a:lstStyle/>
+          <a:p>
+            <a:endParaRPr lang="en-US"/>
+          </a:p>
+        </p:txBody>
+      </p:sp>
+      <p:pic>
+        <p:nvPicPr>
+          <p:cNvPr id="7" name="Content Placeholder 6" descr="Chart, bar chart&#10;&#10;Description automatically generated">
+            <a:extLst>
+              <a:ext uri="{FF2B5EF4-FFF2-40B4-BE49-F238E27FC236}">
+                <a16:creationId xmlns:a16="http://schemas.microsoft.com/office/drawing/2014/main" id="{2CE612E7-16BF-44B6-B5AF-442F4D90AB0B}"/>
+              </a:ext>
+            </a:extLst>
+          </p:cNvPr>
+          <p:cNvPicPr>
+            <a:picLocks noGrp="1" noChangeAspect="1"/>
+          </p:cNvPicPr>
+          <p:nvPr>
+            <p:ph idx="1"/>
+          </p:nvPr>
+        </p:nvPicPr>
+        <p:blipFill>
+          <a:blip r:embed="rId2">
+            <a:extLst>
+              <a:ext uri="{28A0092B-C50C-407E-A947-70E740481C1C}">
+                <a14:useLocalDpi xmlns:a14="http://schemas.microsoft.com/office/drawing/2010/main" val="0"/>
+              </a:ext>
+            </a:extLst>
+          </a:blip>
+          <a:stretch>
+            <a:fillRect/>
+          </a:stretch>
+        </p:blipFill>
+        <p:spPr>
+          <a:xfrm>
+            <a:off x="0" y="0"/>
+            <a:ext cx="12192000" cy="6858000"/>
+          </a:xfrm>
+        </p:spPr>
+      </p:pic>
+    </p:spTree>
+    <p:extLst>
+      <p:ext uri="{BB962C8B-B14F-4D97-AF65-F5344CB8AC3E}">
+        <p14:creationId xmlns:p14="http://schemas.microsoft.com/office/powerpoint/2010/main" val="3170861724"/>
+      </p:ext>
+    </p:extLst>
+  </p:cSld>
+  <p:clrMapOvr>
+    <a:masterClrMapping/>
+  </p:clrMapOvr>
+</p:sld>
+</file>
+
+<file path=ppt/slides/slide11.xml><?xml version="1.0" encoding="utf-8"?>
+<p:sld xmlns:a="http://schemas.openxmlformats.org/drawingml/2006/main" xmlns:r="http://schemas.openxmlformats.org/officeDocument/2006/relationships" xmlns:p="http://schemas.openxmlformats.org/presentationml/2006/main">
+  <p:cSld>
     <p:bg>
       <p:bgPr>
         <a:solidFill>
@@ -24977,7 +25068,7 @@
 </p:sld>
 </file>
 
-<file path=ppt/slides/slide11.xml><?xml version="1.0" encoding="utf-8"?>
+<file path=ppt/slides/slide12.xml><?xml version="1.0" encoding="utf-8"?>
 <p:sld xmlns:a="http://schemas.openxmlformats.org/drawingml/2006/main" xmlns:r="http://schemas.openxmlformats.org/officeDocument/2006/relationships" xmlns:p="http://schemas.openxmlformats.org/presentationml/2006/main">
   <p:cSld>
     <p:bg>
@@ -25692,6 +25783,42 @@
           </a:prstGeom>
         </p:spPr>
       </p:pic>
+      <p:pic>
+        <p:nvPicPr>
+          <p:cNvPr id="5" name="Picture 4" descr="Chart, scatter chart&#10;&#10;Description automatically generated">
+            <a:extLst>
+              <a:ext uri="{FF2B5EF4-FFF2-40B4-BE49-F238E27FC236}">
+                <a16:creationId xmlns:a16="http://schemas.microsoft.com/office/drawing/2014/main" id="{23D15DDD-4370-406E-ACFF-97A85F583D84}"/>
+              </a:ext>
+            </a:extLst>
+          </p:cNvPr>
+          <p:cNvPicPr>
+            <a:picLocks noChangeAspect="1"/>
+          </p:cNvPicPr>
+          <p:nvPr/>
+        </p:nvPicPr>
+        <p:blipFill>
+          <a:blip r:embed="rId3">
+            <a:extLst>
+              <a:ext uri="{28A0092B-C50C-407E-A947-70E740481C1C}">
+                <a14:useLocalDpi xmlns:a14="http://schemas.microsoft.com/office/drawing/2010/main" val="0"/>
+              </a:ext>
+            </a:extLst>
+          </a:blip>
+          <a:stretch>
+            <a:fillRect/>
+          </a:stretch>
+        </p:blipFill>
+        <p:spPr>
+          <a:xfrm>
+            <a:off x="0" y="0"/>
+            <a:ext cx="12192000" cy="6858000"/>
+          </a:xfrm>
+          <a:prstGeom prst="rect">
+            <a:avLst/>
+          </a:prstGeom>
+        </p:spPr>
+      </p:pic>
     </p:spTree>
     <p:extLst>
       <p:ext uri="{BB962C8B-B14F-4D97-AF65-F5344CB8AC3E}">
@@ -25706,6 +25833,132 @@
 </file>
 
 <file path=ppt/slides/slide5.xml><?xml version="1.0" encoding="utf-8"?>
+<p:sld xmlns:a="http://schemas.openxmlformats.org/drawingml/2006/main" xmlns:r="http://schemas.openxmlformats.org/officeDocument/2006/relationships" xmlns:p="http://schemas.openxmlformats.org/presentationml/2006/main">
+  <p:cSld>
+    <p:spTree>
+      <p:nvGrpSpPr>
+        <p:cNvPr id="1" name=""/>
+        <p:cNvGrpSpPr/>
+        <p:nvPr/>
+      </p:nvGrpSpPr>
+      <p:grpSpPr>
+        <a:xfrm>
+          <a:off x="0" y="0"/>
+          <a:ext cx="0" cy="0"/>
+          <a:chOff x="0" y="0"/>
+          <a:chExt cx="0" cy="0"/>
+        </a:xfrm>
+      </p:grpSpPr>
+      <p:sp>
+        <p:nvSpPr>
+          <p:cNvPr id="2" name="Title 1">
+            <a:extLst>
+              <a:ext uri="{FF2B5EF4-FFF2-40B4-BE49-F238E27FC236}">
+                <a16:creationId xmlns:a16="http://schemas.microsoft.com/office/drawing/2014/main" id="{6A087D5B-BFC7-4D4F-A7C3-8EF07BAB3B6F}"/>
+              </a:ext>
+            </a:extLst>
+          </p:cNvPr>
+          <p:cNvSpPr>
+            <a:spLocks noGrp="1"/>
+          </p:cNvSpPr>
+          <p:nvPr>
+            <p:ph type="title"/>
+          </p:nvPr>
+        </p:nvSpPr>
+        <p:spPr/>
+        <p:txBody>
+          <a:bodyPr/>
+          <a:lstStyle/>
+          <a:p>
+            <a:endParaRPr lang="en-US"/>
+          </a:p>
+        </p:txBody>
+      </p:sp>
+      <p:pic>
+        <p:nvPicPr>
+          <p:cNvPr id="9" name="Content Placeholder 8" descr="Chart, scatter chart&#10;&#10;Description automatically generated">
+            <a:extLst>
+              <a:ext uri="{FF2B5EF4-FFF2-40B4-BE49-F238E27FC236}">
+                <a16:creationId xmlns:a16="http://schemas.microsoft.com/office/drawing/2014/main" id="{4EFAEFC9-BC73-4C75-BDEF-845CC878483A}"/>
+              </a:ext>
+            </a:extLst>
+          </p:cNvPr>
+          <p:cNvPicPr>
+            <a:picLocks noGrp="1" noChangeAspect="1"/>
+          </p:cNvPicPr>
+          <p:nvPr>
+            <p:ph idx="1"/>
+          </p:nvPr>
+        </p:nvPicPr>
+        <p:blipFill>
+          <a:blip r:embed="rId2">
+            <a:extLst>
+              <a:ext uri="{28A0092B-C50C-407E-A947-70E740481C1C}">
+                <a14:useLocalDpi xmlns:a14="http://schemas.microsoft.com/office/drawing/2010/main" val="0"/>
+              </a:ext>
+            </a:extLst>
+          </a:blip>
+          <a:stretch>
+            <a:fillRect/>
+          </a:stretch>
+        </p:blipFill>
+        <p:spPr>
+          <a:xfrm>
+            <a:off x="0" y="0"/>
+            <a:ext cx="12192000" cy="6858000"/>
+          </a:xfrm>
+        </p:spPr>
+      </p:pic>
+      <p:pic>
+        <p:nvPicPr>
+          <p:cNvPr id="11" name="Picture 10" descr="Chart, scatter chart&#10;&#10;Description automatically generated">
+            <a:extLst>
+              <a:ext uri="{FF2B5EF4-FFF2-40B4-BE49-F238E27FC236}">
+                <a16:creationId xmlns:a16="http://schemas.microsoft.com/office/drawing/2014/main" id="{AD9E92E0-1830-440D-9B7F-4EF248A8D98E}"/>
+              </a:ext>
+            </a:extLst>
+          </p:cNvPr>
+          <p:cNvPicPr>
+            <a:picLocks noChangeAspect="1"/>
+          </p:cNvPicPr>
+          <p:nvPr/>
+        </p:nvPicPr>
+        <p:blipFill>
+          <a:blip r:embed="rId3">
+            <a:extLst>
+              <a:ext uri="{28A0092B-C50C-407E-A947-70E740481C1C}">
+                <a14:useLocalDpi xmlns:a14="http://schemas.microsoft.com/office/drawing/2010/main" val="0"/>
+              </a:ext>
+            </a:extLst>
+          </a:blip>
+          <a:stretch>
+            <a:fillRect/>
+          </a:stretch>
+        </p:blipFill>
+        <p:spPr>
+          <a:xfrm>
+            <a:off x="0" y="0"/>
+            <a:ext cx="12192000" cy="6858000"/>
+          </a:xfrm>
+          <a:prstGeom prst="rect">
+            <a:avLst/>
+          </a:prstGeom>
+        </p:spPr>
+      </p:pic>
+    </p:spTree>
+    <p:extLst>
+      <p:ext uri="{BB962C8B-B14F-4D97-AF65-F5344CB8AC3E}">
+        <p14:creationId xmlns:p14="http://schemas.microsoft.com/office/powerpoint/2010/main" val="983991851"/>
+      </p:ext>
+    </p:extLst>
+  </p:cSld>
+  <p:clrMapOvr>
+    <a:masterClrMapping/>
+  </p:clrMapOvr>
+</p:sld>
+</file>
+
+<file path=ppt/slides/slide6.xml><?xml version="1.0" encoding="utf-8"?>
 <p:sld xmlns:a="http://schemas.openxmlformats.org/drawingml/2006/main" xmlns:r="http://schemas.openxmlformats.org/officeDocument/2006/relationships" xmlns:p="http://schemas.openxmlformats.org/presentationml/2006/main">
   <p:cSld>
     <p:spTree>
@@ -25749,10 +26002,10 @@
       </p:sp>
       <p:pic>
         <p:nvPicPr>
-          <p:cNvPr id="9" name="Content Placeholder 8">
+          <p:cNvPr id="6" name="Content Placeholder 5" descr="Chart&#10;&#10;Description automatically generated with medium confidence">
             <a:extLst>
               <a:ext uri="{FF2B5EF4-FFF2-40B4-BE49-F238E27FC236}">
-                <a16:creationId xmlns:a16="http://schemas.microsoft.com/office/drawing/2014/main" id="{49BFF1C5-3490-471C-B869-6AE492121258}"/>
+                <a16:creationId xmlns:a16="http://schemas.microsoft.com/office/drawing/2014/main" id="{50062932-60C3-40E9-9A70-F4E82F9331DD}"/>
               </a:ext>
             </a:extLst>
           </p:cNvPr>
@@ -25771,14 +26024,51 @@
               </a:ext>
             </a:extLst>
           </a:blip>
-          <a:srcRect/>
-          <a:stretch/>
+          <a:stretch>
+            <a:fillRect/>
+          </a:stretch>
         </p:blipFill>
         <p:spPr>
           <a:xfrm>
             <a:off x="0" y="0"/>
-            <a:ext cx="12192000" cy="6857999"/>
+            <a:ext cx="12192000" cy="6858000"/>
           </a:xfrm>
+        </p:spPr>
+      </p:pic>
+      <p:pic>
+        <p:nvPicPr>
+          <p:cNvPr id="8" name="Picture 7" descr="Chart&#10;&#10;Description automatically generated with medium confidence">
+            <a:extLst>
+              <a:ext uri="{FF2B5EF4-FFF2-40B4-BE49-F238E27FC236}">
+                <a16:creationId xmlns:a16="http://schemas.microsoft.com/office/drawing/2014/main" id="{334D53CA-D86C-4ED5-9301-7DB024C718C8}"/>
+              </a:ext>
+            </a:extLst>
+          </p:cNvPr>
+          <p:cNvPicPr>
+            <a:picLocks noChangeAspect="1"/>
+          </p:cNvPicPr>
+          <p:nvPr/>
+        </p:nvPicPr>
+        <p:blipFill>
+          <a:blip r:embed="rId2">
+            <a:extLst>
+              <a:ext uri="{28A0092B-C50C-407E-A947-70E740481C1C}">
+                <a14:useLocalDpi xmlns:a14="http://schemas.microsoft.com/office/drawing/2010/main" val="0"/>
+              </a:ext>
+            </a:extLst>
+          </a:blip>
+          <a:stretch>
+            <a:fillRect/>
+          </a:stretch>
+        </p:blipFill>
+        <p:spPr>
+          <a:xfrm>
+            <a:off x="0" y="0"/>
+            <a:ext cx="12192000" cy="6858000"/>
+          </a:xfrm>
+          <a:prstGeom prst="rect">
+            <a:avLst/>
+          </a:prstGeom>
         </p:spPr>
       </p:pic>
     </p:spTree>
@@ -25794,7 +26084,7 @@
 </p:sld>
 </file>
 
-<file path=ppt/slides/slide6.xml><?xml version="1.0" encoding="utf-8"?>
+<file path=ppt/slides/slide7.xml><?xml version="1.0" encoding="utf-8"?>
 <p:sld xmlns:a="http://schemas.openxmlformats.org/drawingml/2006/main" xmlns:r="http://schemas.openxmlformats.org/officeDocument/2006/relationships" xmlns:p="http://schemas.openxmlformats.org/presentationml/2006/main">
   <p:cSld>
     <p:spTree>
@@ -25813,10 +26103,10 @@
       </p:grpSpPr>
       <p:pic>
         <p:nvPicPr>
-          <p:cNvPr id="13" name="Picture 12">
+          <p:cNvPr id="3" name="Picture 2" descr="A picture containing chart&#10;&#10;Description automatically generated">
             <a:extLst>
               <a:ext uri="{FF2B5EF4-FFF2-40B4-BE49-F238E27FC236}">
-                <a16:creationId xmlns:a16="http://schemas.microsoft.com/office/drawing/2014/main" id="{5EDC99F4-B5A8-4CB2-BD34-9ED3D8329D15}"/>
+                <a16:creationId xmlns:a16="http://schemas.microsoft.com/office/drawing/2014/main" id="{481DAAA2-4ACA-4F9C-B365-D1348C845B5A}"/>
               </a:ext>
             </a:extLst>
           </p:cNvPr>
@@ -25833,13 +26123,50 @@
               </a:ext>
             </a:extLst>
           </a:blip>
-          <a:srcRect/>
-          <a:stretch/>
+          <a:stretch>
+            <a:fillRect/>
+          </a:stretch>
         </p:blipFill>
         <p:spPr>
           <a:xfrm>
             <a:off x="0" y="0"/>
-            <a:ext cx="12192000" cy="6857999"/>
+            <a:ext cx="12192000" cy="6858000"/>
+          </a:xfrm>
+          <a:prstGeom prst="rect">
+            <a:avLst/>
+          </a:prstGeom>
+        </p:spPr>
+      </p:pic>
+      <p:pic>
+        <p:nvPicPr>
+          <p:cNvPr id="5" name="Picture 4" descr="A picture containing chart&#10;&#10;Description automatically generated">
+            <a:extLst>
+              <a:ext uri="{FF2B5EF4-FFF2-40B4-BE49-F238E27FC236}">
+                <a16:creationId xmlns:a16="http://schemas.microsoft.com/office/drawing/2014/main" id="{8D509CE9-E6D9-4EAD-97CE-4DE4155D5C3C}"/>
+              </a:ext>
+            </a:extLst>
+          </p:cNvPr>
+          <p:cNvPicPr>
+            <a:picLocks noChangeAspect="1"/>
+          </p:cNvPicPr>
+          <p:nvPr/>
+        </p:nvPicPr>
+        <p:blipFill>
+          <a:blip r:embed="rId2">
+            <a:extLst>
+              <a:ext uri="{28A0092B-C50C-407E-A947-70E740481C1C}">
+                <a14:useLocalDpi xmlns:a14="http://schemas.microsoft.com/office/drawing/2010/main" val="0"/>
+              </a:ext>
+            </a:extLst>
+          </a:blip>
+          <a:stretch>
+            <a:fillRect/>
+          </a:stretch>
+        </p:blipFill>
+        <p:spPr>
+          <a:xfrm>
+            <a:off x="0" y="0"/>
+            <a:ext cx="12192000" cy="6858000"/>
           </a:xfrm>
           <a:prstGeom prst="rect">
             <a:avLst/>
@@ -25859,7 +26186,7 @@
 </p:sld>
 </file>
 
-<file path=ppt/slides/slide7.xml><?xml version="1.0" encoding="utf-8"?>
+<file path=ppt/slides/slide8.xml><?xml version="1.0" encoding="utf-8"?>
 <p:sld xmlns:a="http://schemas.openxmlformats.org/drawingml/2006/main" xmlns:r="http://schemas.openxmlformats.org/officeDocument/2006/relationships" xmlns:p="http://schemas.openxmlformats.org/presentationml/2006/main">
   <p:cSld>
     <p:spTree>
@@ -25948,7 +26275,7 @@
 </p:sld>
 </file>
 
-<file path=ppt/slides/slide8.xml><?xml version="1.0" encoding="utf-8"?>
+<file path=ppt/slides/slide9.xml><?xml version="1.0" encoding="utf-8"?>
 <p:sld xmlns:a="http://schemas.openxmlformats.org/drawingml/2006/main" xmlns:r="http://schemas.openxmlformats.org/officeDocument/2006/relationships" xmlns:p="http://schemas.openxmlformats.org/presentationml/2006/main">
   <p:cSld>
     <p:spTree>
@@ -26004,96 +26331,6 @@
     <p:extLst>
       <p:ext uri="{BB962C8B-B14F-4D97-AF65-F5344CB8AC3E}">
         <p14:creationId xmlns:p14="http://schemas.microsoft.com/office/powerpoint/2010/main" val="1237201420"/>
-      </p:ext>
-    </p:extLst>
-  </p:cSld>
-  <p:clrMapOvr>
-    <a:masterClrMapping/>
-  </p:clrMapOvr>
-</p:sld>
-</file>
-
-<file path=ppt/slides/slide9.xml><?xml version="1.0" encoding="utf-8"?>
-<p:sld xmlns:a="http://schemas.openxmlformats.org/drawingml/2006/main" xmlns:r="http://schemas.openxmlformats.org/officeDocument/2006/relationships" xmlns:p="http://schemas.openxmlformats.org/presentationml/2006/main">
-  <p:cSld>
-    <p:spTree>
-      <p:nvGrpSpPr>
-        <p:cNvPr id="1" name=""/>
-        <p:cNvGrpSpPr/>
-        <p:nvPr/>
-      </p:nvGrpSpPr>
-      <p:grpSpPr>
-        <a:xfrm>
-          <a:off x="0" y="0"/>
-          <a:ext cx="0" cy="0"/>
-          <a:chOff x="0" y="0"/>
-          <a:chExt cx="0" cy="0"/>
-        </a:xfrm>
-      </p:grpSpPr>
-      <p:sp>
-        <p:nvSpPr>
-          <p:cNvPr id="2" name="Title 1">
-            <a:extLst>
-              <a:ext uri="{FF2B5EF4-FFF2-40B4-BE49-F238E27FC236}">
-                <a16:creationId xmlns:a16="http://schemas.microsoft.com/office/drawing/2014/main" id="{BC8205F9-AD5E-454F-8FBA-339D16DBF12D}"/>
-              </a:ext>
-            </a:extLst>
-          </p:cNvPr>
-          <p:cNvSpPr>
-            <a:spLocks noGrp="1"/>
-          </p:cNvSpPr>
-          <p:nvPr>
-            <p:ph type="title"/>
-          </p:nvPr>
-        </p:nvSpPr>
-        <p:spPr/>
-        <p:txBody>
-          <a:bodyPr/>
-          <a:lstStyle/>
-          <a:p>
-            <a:endParaRPr lang="en-US"/>
-          </a:p>
-        </p:txBody>
-      </p:sp>
-      <p:pic>
-        <p:nvPicPr>
-          <p:cNvPr id="7" name="Content Placeholder 6" descr="Chart, bar chart&#10;&#10;Description automatically generated">
-            <a:extLst>
-              <a:ext uri="{FF2B5EF4-FFF2-40B4-BE49-F238E27FC236}">
-                <a16:creationId xmlns:a16="http://schemas.microsoft.com/office/drawing/2014/main" id="{2CE612E7-16BF-44B6-B5AF-442F4D90AB0B}"/>
-              </a:ext>
-            </a:extLst>
-          </p:cNvPr>
-          <p:cNvPicPr>
-            <a:picLocks noGrp="1" noChangeAspect="1"/>
-          </p:cNvPicPr>
-          <p:nvPr>
-            <p:ph idx="1"/>
-          </p:nvPr>
-        </p:nvPicPr>
-        <p:blipFill>
-          <a:blip r:embed="rId2">
-            <a:extLst>
-              <a:ext uri="{28A0092B-C50C-407E-A947-70E740481C1C}">
-                <a14:useLocalDpi xmlns:a14="http://schemas.microsoft.com/office/drawing/2010/main" val="0"/>
-              </a:ext>
-            </a:extLst>
-          </a:blip>
-          <a:stretch>
-            <a:fillRect/>
-          </a:stretch>
-        </p:blipFill>
-        <p:spPr>
-          <a:xfrm>
-            <a:off x="0" y="0"/>
-            <a:ext cx="12192000" cy="6858000"/>
-          </a:xfrm>
-        </p:spPr>
-      </p:pic>
-    </p:spTree>
-    <p:extLst>
-      <p:ext uri="{BB962C8B-B14F-4D97-AF65-F5344CB8AC3E}">
-        <p14:creationId xmlns:p14="http://schemas.microsoft.com/office/powerpoint/2010/main" val="3170861724"/>
       </p:ext>
     </p:extLst>
   </p:cSld>

</xml_diff>